<commit_message>
Part added for experiment and results
</commit_message>
<xml_diff>
--- a/GANs_Presentation.pptx
+++ b/GANs_Presentation.pptx
@@ -5,7 +5,7 @@
     <p:sldMasterId id="2147483660" r:id="rId1"/>
   </p:sldMasterIdLst>
   <p:notesMasterIdLst>
-    <p:notesMasterId r:id="rId14"/>
+    <p:notesMasterId r:id="rId15"/>
   </p:notesMasterIdLst>
   <p:sldIdLst>
     <p:sldId id="257" r:id="rId2"/>
@@ -16,10 +16,11 @@
     <p:sldId id="261" r:id="rId7"/>
     <p:sldId id="267" r:id="rId8"/>
     <p:sldId id="262" r:id="rId9"/>
-    <p:sldId id="263" r:id="rId10"/>
-    <p:sldId id="270" r:id="rId11"/>
-    <p:sldId id="264" r:id="rId12"/>
-    <p:sldId id="266" r:id="rId13"/>
+    <p:sldId id="271" r:id="rId10"/>
+    <p:sldId id="263" r:id="rId11"/>
+    <p:sldId id="270" r:id="rId12"/>
+    <p:sldId id="264" r:id="rId13"/>
+    <p:sldId id="266" r:id="rId14"/>
   </p:sldIdLst>
   <p:sldSz cx="12192000" cy="6858000"/>
   <p:notesSz cx="6858000" cy="9144000"/>
@@ -139,6 +140,7 @@
         </p14:section>
         <p14:section name="Conclusion" id="{13D64738-9391-4AE5-B6DE-4045F8B8B114}">
           <p14:sldIdLst>
+            <p14:sldId id="271"/>
             <p14:sldId id="263"/>
             <p14:sldId id="270"/>
             <p14:sldId id="264"/>
@@ -21306,7 +21308,7 @@
           <a:p>
             <a:fld id="{EF1F8642-D45F-4091-BD92-9872F55A1863}" type="datetimeFigureOut">
               <a:rPr lang="en-IN" smtClean="0"/>
-              <a:t>27-11-2021</a:t>
+              <a:t>28-11-2021</a:t>
             </a:fld>
             <a:endParaRPr lang="en-IN"/>
           </a:p>
@@ -22207,6 +22209,123 @@
           <a:bodyPr/>
           <a:lstStyle/>
           <a:p>
+            <a:pPr marL="228600" indent="-228600">
+              <a:buAutoNum type="alphaLcParenR"/>
+            </a:pPr>
+            <a:r>
+              <a:rPr lang="en-IN" dirty="0"/>
+              <a:t>MNIST dataset</a:t>
+            </a:r>
+          </a:p>
+          <a:p>
+            <a:pPr marL="228600" indent="-228600">
+              <a:buAutoNum type="alphaLcParenR"/>
+            </a:pPr>
+            <a:r>
+              <a:rPr lang="en-IN" dirty="0"/>
+              <a:t>TFD dataset</a:t>
+            </a:r>
+          </a:p>
+          <a:p>
+            <a:pPr marL="228600" indent="-228600">
+              <a:buAutoNum type="alphaLcParenR"/>
+            </a:pPr>
+            <a:r>
+              <a:rPr lang="en-IN" dirty="0"/>
+              <a:t>CIFAR-10 -&gt; fully connected model</a:t>
+            </a:r>
+          </a:p>
+          <a:p>
+            <a:pPr marL="228600" indent="-228600">
+              <a:buAutoNum type="alphaLcParenR"/>
+            </a:pPr>
+            <a:r>
+              <a:rPr lang="en-IN" dirty="0"/>
+              <a:t>CIFAR-10 -&gt; Convolutional discriminator and “deconvolutional” generator</a:t>
+            </a:r>
+          </a:p>
+        </p:txBody>
+      </p:sp>
+      <p:sp>
+        <p:nvSpPr>
+          <p:cNvPr id="4" name="Slide Number Placeholder 3"/>
+          <p:cNvSpPr>
+            <a:spLocks noGrp="1"/>
+          </p:cNvSpPr>
+          <p:nvPr>
+            <p:ph type="sldNum" sz="quarter" idx="5"/>
+          </p:nvPr>
+        </p:nvSpPr>
+        <p:spPr/>
+        <p:txBody>
+          <a:bodyPr/>
+          <a:lstStyle/>
+          <a:p>
+            <a:fld id="{A914F299-9927-4EE6-A360-E92782AD9637}" type="slidenum">
+              <a:rPr lang="en-IN" smtClean="0"/>
+              <a:t>9</a:t>
+            </a:fld>
+            <a:endParaRPr lang="en-IN"/>
+          </a:p>
+        </p:txBody>
+      </p:sp>
+    </p:spTree>
+    <p:extLst>
+      <p:ext uri="{BB962C8B-B14F-4D97-AF65-F5344CB8AC3E}">
+        <p14:creationId xmlns:p14="http://schemas.microsoft.com/office/powerpoint/2010/main" val="1564099153"/>
+      </p:ext>
+    </p:extLst>
+  </p:cSld>
+  <p:clrMapOvr>
+    <a:masterClrMapping/>
+  </p:clrMapOvr>
+</p:notes>
+</file>
+
+<file path=ppt/notesSlides/notesSlide8.xml><?xml version="1.0" encoding="utf-8"?>
+<p:notes xmlns:a="http://schemas.openxmlformats.org/drawingml/2006/main" xmlns:r="http://schemas.openxmlformats.org/officeDocument/2006/relationships" xmlns:p="http://schemas.openxmlformats.org/presentationml/2006/main">
+  <p:cSld>
+    <p:spTree>
+      <p:nvGrpSpPr>
+        <p:cNvPr id="1" name=""/>
+        <p:cNvGrpSpPr/>
+        <p:nvPr/>
+      </p:nvGrpSpPr>
+      <p:grpSpPr>
+        <a:xfrm>
+          <a:off x="0" y="0"/>
+          <a:ext cx="0" cy="0"/>
+          <a:chOff x="0" y="0"/>
+          <a:chExt cx="0" cy="0"/>
+        </a:xfrm>
+      </p:grpSpPr>
+      <p:sp>
+        <p:nvSpPr>
+          <p:cNvPr id="2" name="Slide Image Placeholder 1"/>
+          <p:cNvSpPr>
+            <a:spLocks noGrp="1" noRot="1" noChangeAspect="1"/>
+          </p:cNvSpPr>
+          <p:nvPr>
+            <p:ph type="sldImg"/>
+          </p:nvPr>
+        </p:nvSpPr>
+        <p:spPr/>
+      </p:sp>
+      <p:sp>
+        <p:nvSpPr>
+          <p:cNvPr id="3" name="Notes Placeholder 2"/>
+          <p:cNvSpPr>
+            <a:spLocks noGrp="1"/>
+          </p:cNvSpPr>
+          <p:nvPr>
+            <p:ph type="body" idx="1"/>
+          </p:nvPr>
+        </p:nvSpPr>
+        <p:spPr/>
+        <p:txBody>
+          <a:bodyPr/>
+          <a:lstStyle/>
+          <a:p>
             <a:r>
               <a:rPr lang="en-IN" dirty="0"/>
               <a:t>Now, let me provide why at all to use Generative Adversarial Networks? Use of Latent code, which is basically transforming our input space into latent space that allows dimension reduction. Unlike Fully visible belief nets, we can have reduces number of features. To provide an example, Imagine running this model for 4K image, which basically has over 4000 pixels, each of these pixels become a feature in your NN. Training all these features will require a very high compute power. </a:t>
@@ -22257,7 +22376,7 @@
           <a:p>
             <a:fld id="{A914F299-9927-4EE6-A360-E92782AD9637}" type="slidenum">
               <a:rPr lang="en-IN" smtClean="0"/>
-              <a:t>9</a:t>
+              <a:t>10</a:t>
             </a:fld>
             <a:endParaRPr lang="en-IN"/>
           </a:p>
@@ -22276,7 +22395,7 @@
 </p:notes>
 </file>
 
-<file path=ppt/notesSlides/notesSlide8.xml><?xml version="1.0" encoding="utf-8"?>
+<file path=ppt/notesSlides/notesSlide9.xml><?xml version="1.0" encoding="utf-8"?>
 <p:notes xmlns:a="http://schemas.openxmlformats.org/drawingml/2006/main" xmlns:r="http://schemas.openxmlformats.org/officeDocument/2006/relationships" xmlns:p="http://schemas.openxmlformats.org/presentationml/2006/main">
   <p:cSld>
     <p:spTree>
@@ -22341,7 +22460,7 @@
           <a:p>
             <a:fld id="{A914F299-9927-4EE6-A360-E92782AD9637}" type="slidenum">
               <a:rPr lang="en-IN" smtClean="0"/>
-              <a:t>10</a:t>
+              <a:t>11</a:t>
             </a:fld>
             <a:endParaRPr lang="en-IN"/>
           </a:p>
@@ -22634,7 +22753,7 @@
           <a:p>
             <a:fld id="{C867DA01-B677-4D1B-BA60-C7EAB0069DDD}" type="datetimeFigureOut">
               <a:rPr lang="en-IN" smtClean="0"/>
-              <a:t>27-11-2021</a:t>
+              <a:t>28-11-2021</a:t>
             </a:fld>
             <a:endParaRPr lang="en-IN"/>
           </a:p>
@@ -23048,7 +23167,7 @@
           <a:p>
             <a:fld id="{C867DA01-B677-4D1B-BA60-C7EAB0069DDD}" type="datetimeFigureOut">
               <a:rPr lang="en-IN" smtClean="0"/>
-              <a:t>27-11-2021</a:t>
+              <a:t>28-11-2021</a:t>
             </a:fld>
             <a:endParaRPr lang="en-IN"/>
           </a:p>
@@ -23384,7 +23503,7 @@
           <a:p>
             <a:fld id="{C867DA01-B677-4D1B-BA60-C7EAB0069DDD}" type="datetimeFigureOut">
               <a:rPr lang="en-IN" smtClean="0"/>
-              <a:t>27-11-2021</a:t>
+              <a:t>28-11-2021</a:t>
             </a:fld>
             <a:endParaRPr lang="en-IN"/>
           </a:p>
@@ -23789,7 +23908,7 @@
           <a:p>
             <a:fld id="{C867DA01-B677-4D1B-BA60-C7EAB0069DDD}" type="datetimeFigureOut">
               <a:rPr lang="en-IN" smtClean="0"/>
-              <a:t>27-11-2021</a:t>
+              <a:t>28-11-2021</a:t>
             </a:fld>
             <a:endParaRPr lang="en-IN"/>
           </a:p>
@@ -24357,7 +24476,7 @@
           <a:p>
             <a:fld id="{C867DA01-B677-4D1B-BA60-C7EAB0069DDD}" type="datetimeFigureOut">
               <a:rPr lang="en-IN" smtClean="0"/>
-              <a:t>27-11-2021</a:t>
+              <a:t>28-11-2021</a:t>
             </a:fld>
             <a:endParaRPr lang="en-IN"/>
           </a:p>
@@ -25038,7 +25157,7 @@
           <a:p>
             <a:fld id="{C867DA01-B677-4D1B-BA60-C7EAB0069DDD}" type="datetimeFigureOut">
               <a:rPr lang="en-IN" smtClean="0"/>
-              <a:t>27-11-2021</a:t>
+              <a:t>28-11-2021</a:t>
             </a:fld>
             <a:endParaRPr lang="en-IN"/>
           </a:p>
@@ -25951,7 +26070,7 @@
           <a:p>
             <a:fld id="{C867DA01-B677-4D1B-BA60-C7EAB0069DDD}" type="datetimeFigureOut">
               <a:rPr lang="en-IN" smtClean="0"/>
-              <a:t>27-11-2021</a:t>
+              <a:t>28-11-2021</a:t>
             </a:fld>
             <a:endParaRPr lang="en-IN"/>
           </a:p>
@@ -26264,7 +26383,7 @@
           <a:p>
             <a:fld id="{C867DA01-B677-4D1B-BA60-C7EAB0069DDD}" type="datetimeFigureOut">
               <a:rPr lang="en-IN" smtClean="0"/>
-              <a:t>27-11-2021</a:t>
+              <a:t>28-11-2021</a:t>
             </a:fld>
             <a:endParaRPr lang="en-IN"/>
           </a:p>
@@ -26528,7 +26647,7 @@
           <a:p>
             <a:fld id="{C867DA01-B677-4D1B-BA60-C7EAB0069DDD}" type="datetimeFigureOut">
               <a:rPr lang="en-IN" smtClean="0"/>
-              <a:t>27-11-2021</a:t>
+              <a:t>28-11-2021</a:t>
             </a:fld>
             <a:endParaRPr lang="en-IN"/>
           </a:p>
@@ -26851,7 +26970,7 @@
           <a:p>
             <a:fld id="{C867DA01-B677-4D1B-BA60-C7EAB0069DDD}" type="datetimeFigureOut">
               <a:rPr lang="en-IN" smtClean="0"/>
-              <a:t>27-11-2021</a:t>
+              <a:t>28-11-2021</a:t>
             </a:fld>
             <a:endParaRPr lang="en-IN"/>
           </a:p>
@@ -27240,7 +27359,7 @@
           <a:p>
             <a:fld id="{C867DA01-B677-4D1B-BA60-C7EAB0069DDD}" type="datetimeFigureOut">
               <a:rPr lang="en-IN" smtClean="0"/>
-              <a:t>27-11-2021</a:t>
+              <a:t>28-11-2021</a:t>
             </a:fld>
             <a:endParaRPr lang="en-IN"/>
           </a:p>
@@ -27616,7 +27735,7 @@
           <a:p>
             <a:fld id="{C867DA01-B677-4D1B-BA60-C7EAB0069DDD}" type="datetimeFigureOut">
               <a:rPr lang="en-IN" smtClean="0"/>
-              <a:t>27-11-2021</a:t>
+              <a:t>28-11-2021</a:t>
             </a:fld>
             <a:endParaRPr lang="en-IN"/>
           </a:p>
@@ -28122,7 +28241,7 @@
           <a:p>
             <a:fld id="{C867DA01-B677-4D1B-BA60-C7EAB0069DDD}" type="datetimeFigureOut">
               <a:rPr lang="en-IN" smtClean="0"/>
-              <a:t>27-11-2021</a:t>
+              <a:t>28-11-2021</a:t>
             </a:fld>
             <a:endParaRPr lang="en-IN"/>
           </a:p>
@@ -28379,7 +28498,7 @@
           <a:p>
             <a:fld id="{C867DA01-B677-4D1B-BA60-C7EAB0069DDD}" type="datetimeFigureOut">
               <a:rPr lang="en-IN" smtClean="0"/>
-              <a:t>27-11-2021</a:t>
+              <a:t>28-11-2021</a:t>
             </a:fld>
             <a:endParaRPr lang="en-IN"/>
           </a:p>
@@ -28542,7 +28661,7 @@
           <a:p>
             <a:fld id="{C867DA01-B677-4D1B-BA60-C7EAB0069DDD}" type="datetimeFigureOut">
               <a:rPr lang="en-IN" smtClean="0"/>
-              <a:t>27-11-2021</a:t>
+              <a:t>28-11-2021</a:t>
             </a:fld>
             <a:endParaRPr lang="en-IN"/>
           </a:p>
@@ -28932,7 +29051,7 @@
           <a:p>
             <a:fld id="{C867DA01-B677-4D1B-BA60-C7EAB0069DDD}" type="datetimeFigureOut">
               <a:rPr lang="en-IN" smtClean="0"/>
-              <a:t>27-11-2021</a:t>
+              <a:t>28-11-2021</a:t>
             </a:fld>
             <a:endParaRPr lang="en-IN"/>
           </a:p>
@@ -29341,7 +29460,7 @@
           <a:p>
             <a:fld id="{C867DA01-B677-4D1B-BA60-C7EAB0069DDD}" type="datetimeFigureOut">
               <a:rPr lang="en-IN" smtClean="0"/>
-              <a:t>27-11-2021</a:t>
+              <a:t>28-11-2021</a:t>
             </a:fld>
             <a:endParaRPr lang="en-IN"/>
           </a:p>
@@ -29585,7 +29704,7 @@
           <a:p>
             <a:fld id="{C867DA01-B677-4D1B-BA60-C7EAB0069DDD}" type="datetimeFigureOut">
               <a:rPr lang="en-IN" smtClean="0"/>
-              <a:t>27-11-2021</a:t>
+              <a:t>28-11-2021</a:t>
             </a:fld>
             <a:endParaRPr lang="en-IN"/>
           </a:p>
@@ -30505,6 +30624,407 @@
       </p:grpSpPr>
       <p:sp useBgFill="1">
         <p:nvSpPr>
+          <p:cNvPr id="10" name="Rectangle 9">
+            <a:extLst>
+              <a:ext uri="{FF2B5EF4-FFF2-40B4-BE49-F238E27FC236}">
+                <a16:creationId xmlns:a16="http://schemas.microsoft.com/office/drawing/2014/main" id="{B2A773CA-28F4-49C2-BFA3-49A5867C7AFB}"/>
+              </a:ext>
+              <a:ext uri="{C183D7F6-B498-43B3-948B-1728B52AA6E4}">
+                <adec:decorative xmlns:adec="http://schemas.microsoft.com/office/drawing/2017/decorative" val="1"/>
+              </a:ext>
+            </a:extLst>
+          </p:cNvPr>
+          <p:cNvSpPr>
+            <a:spLocks noGrp="1" noRot="1" noChangeAspect="1" noMove="1" noResize="1" noEditPoints="1" noAdjustHandles="1" noChangeArrowheads="1" noChangeShapeType="1" noTextEdit="1"/>
+          </p:cNvSpPr>
+          <p:nvPr>
+            <p:extLst>
+              <p:ext uri="{386F3935-93C4-4BCD-93E2-E3B085C9AB24}">
+                <p16:designElem xmlns:p16="http://schemas.microsoft.com/office/powerpoint/2015/main" val="1"/>
+              </p:ext>
+            </p:extLst>
+          </p:nvPr>
+        </p:nvSpPr>
+        <p:spPr>
+          <a:xfrm>
+            <a:off x="0" y="0"/>
+            <a:ext cx="12188824" cy="6858000"/>
+          </a:xfrm>
+          <a:prstGeom prst="rect">
+            <a:avLst/>
+          </a:prstGeom>
+          <a:ln>
+            <a:noFill/>
+          </a:ln>
+        </p:spPr>
+        <p:style>
+          <a:lnRef idx="2">
+            <a:schemeClr val="accent1">
+              <a:shade val="50000"/>
+            </a:schemeClr>
+          </a:lnRef>
+          <a:fillRef idx="1">
+            <a:schemeClr val="accent1"/>
+          </a:fillRef>
+          <a:effectRef idx="0">
+            <a:schemeClr val="accent1"/>
+          </a:effectRef>
+          <a:fontRef idx="minor">
+            <a:schemeClr val="lt1"/>
+          </a:fontRef>
+        </p:style>
+        <p:txBody>
+          <a:bodyPr rtlCol="0" anchor="ctr"/>
+          <a:lstStyle/>
+          <a:p>
+            <a:pPr algn="ctr"/>
+            <a:endParaRPr lang="en-US"/>
+          </a:p>
+        </p:txBody>
+      </p:sp>
+      <p:pic>
+        <p:nvPicPr>
+          <p:cNvPr id="12" name="Picture 11">
+            <a:extLst>
+              <a:ext uri="{FF2B5EF4-FFF2-40B4-BE49-F238E27FC236}">
+                <a16:creationId xmlns:a16="http://schemas.microsoft.com/office/drawing/2014/main" id="{5D7C72BA-4476-4E4B-BC37-9A75FD0C5951}"/>
+              </a:ext>
+              <a:ext uri="{C183D7F6-B498-43B3-948B-1728B52AA6E4}">
+                <adec:decorative xmlns:adec="http://schemas.microsoft.com/office/drawing/2017/decorative" val="1"/>
+              </a:ext>
+            </a:extLst>
+          </p:cNvPr>
+          <p:cNvPicPr>
+            <a:picLocks noGrp="1" noRot="1" noChangeAspect="1" noMove="1" noResize="1" noEditPoints="1" noAdjustHandles="1" noChangeArrowheads="1" noChangeShapeType="1" noCrop="1"/>
+          </p:cNvPicPr>
+          <p:nvPr>
+            <p:extLst>
+              <p:ext uri="{386F3935-93C4-4BCD-93E2-E3B085C9AB24}">
+                <p16:designElem xmlns:p16="http://schemas.microsoft.com/office/powerpoint/2015/main" val="1"/>
+              </p:ext>
+            </p:extLst>
+          </p:nvPr>
+        </p:nvPicPr>
+        <p:blipFill>
+          <a:blip r:embed="rId3">
+            <a:alphaModFix amt="10000"/>
+            <a:extLst>
+              <a:ext uri="{28A0092B-C50C-407E-A947-70E740481C1C}">
+                <a14:useLocalDpi xmlns:a14="http://schemas.microsoft.com/office/drawing/2010/main" val="0"/>
+              </a:ext>
+            </a:extLst>
+          </a:blip>
+          <a:stretch>
+            <a:fillRect/>
+          </a:stretch>
+        </p:blipFill>
+        <p:spPr>
+          <a:xfrm>
+            <a:off x="0" y="0"/>
+            <a:ext cx="12192000" cy="6858000"/>
+          </a:xfrm>
+          <a:prstGeom prst="rect">
+            <a:avLst/>
+          </a:prstGeom>
+        </p:spPr>
+      </p:pic>
+      <p:sp>
+        <p:nvSpPr>
+          <p:cNvPr id="14" name="Rectangle 13">
+            <a:extLst>
+              <a:ext uri="{FF2B5EF4-FFF2-40B4-BE49-F238E27FC236}">
+                <a16:creationId xmlns:a16="http://schemas.microsoft.com/office/drawing/2014/main" id="{3009A16D-868B-4145-BBC6-555098537EC2}"/>
+              </a:ext>
+              <a:ext uri="{C183D7F6-B498-43B3-948B-1728B52AA6E4}">
+                <adec:decorative xmlns:adec="http://schemas.microsoft.com/office/drawing/2017/decorative" val="1"/>
+              </a:ext>
+            </a:extLst>
+          </p:cNvPr>
+          <p:cNvSpPr>
+            <a:spLocks noGrp="1" noRot="1" noChangeAspect="1" noMove="1" noResize="1" noEditPoints="1" noAdjustHandles="1" noChangeArrowheads="1" noChangeShapeType="1" noTextEdit="1"/>
+          </p:cNvSpPr>
+          <p:nvPr>
+            <p:extLst>
+              <p:ext uri="{386F3935-93C4-4BCD-93E2-E3B085C9AB24}">
+                <p16:designElem xmlns:p16="http://schemas.microsoft.com/office/powerpoint/2015/main" val="1"/>
+              </p:ext>
+            </p:extLst>
+          </p:nvPr>
+        </p:nvSpPr>
+        <p:spPr>
+          <a:xfrm>
+            <a:off x="4644527" y="0"/>
+            <a:ext cx="7552944" cy="6858001"/>
+          </a:xfrm>
+          <a:prstGeom prst="rect">
+            <a:avLst/>
+          </a:prstGeom>
+          <a:ln>
+            <a:noFill/>
+          </a:ln>
+        </p:spPr>
+        <p:style>
+          <a:lnRef idx="2">
+            <a:schemeClr val="accent1">
+              <a:shade val="50000"/>
+            </a:schemeClr>
+          </a:lnRef>
+          <a:fillRef idx="1">
+            <a:schemeClr val="accent1"/>
+          </a:fillRef>
+          <a:effectRef idx="0">
+            <a:schemeClr val="accent1"/>
+          </a:effectRef>
+          <a:fontRef idx="minor">
+            <a:schemeClr val="lt1"/>
+          </a:fontRef>
+        </p:style>
+        <p:txBody>
+          <a:bodyPr rtlCol="0" anchor="ctr"/>
+          <a:lstStyle/>
+          <a:p>
+            <a:pPr algn="ctr"/>
+            <a:endParaRPr lang="en-US"/>
+          </a:p>
+        </p:txBody>
+      </p:sp>
+      <p:pic>
+        <p:nvPicPr>
+          <p:cNvPr id="16" name="Picture 15">
+            <a:extLst>
+              <a:ext uri="{FF2B5EF4-FFF2-40B4-BE49-F238E27FC236}">
+                <a16:creationId xmlns:a16="http://schemas.microsoft.com/office/drawing/2014/main" id="{3992EB33-38E1-4175-8EE2-9BB8CC159C7B}"/>
+              </a:ext>
+              <a:ext uri="{C183D7F6-B498-43B3-948B-1728B52AA6E4}">
+                <adec:decorative xmlns:adec="http://schemas.microsoft.com/office/drawing/2017/decorative" val="1"/>
+              </a:ext>
+            </a:extLst>
+          </p:cNvPr>
+          <p:cNvPicPr>
+            <a:picLocks noGrp="1" noRot="1" noChangeAspect="1" noMove="1" noResize="1" noEditPoints="1" noAdjustHandles="1" noChangeArrowheads="1" noChangeShapeType="1" noCrop="1"/>
+          </p:cNvPicPr>
+          <p:nvPr>
+            <p:extLst>
+              <p:ext uri="{386F3935-93C4-4BCD-93E2-E3B085C9AB24}">
+                <p16:designElem xmlns:p16="http://schemas.microsoft.com/office/powerpoint/2015/main" val="1"/>
+              </p:ext>
+            </p:extLst>
+          </p:nvPr>
+        </p:nvPicPr>
+        <p:blipFill>
+          <a:blip r:embed="rId4" cstate="print">
+            <a:extLst>
+              <a:ext uri="{28A0092B-C50C-407E-A947-70E740481C1C}">
+                <a14:useLocalDpi xmlns:a14="http://schemas.microsoft.com/office/drawing/2010/main" val="0"/>
+              </a:ext>
+            </a:extLst>
+          </a:blip>
+          <a:stretch>
+            <a:fillRect/>
+          </a:stretch>
+        </p:blipFill>
+        <p:spPr>
+          <a:xfrm>
+            <a:off x="1" y="5006045"/>
+            <a:ext cx="4965192" cy="144668"/>
+          </a:xfrm>
+          <a:prstGeom prst="rect">
+            <a:avLst/>
+          </a:prstGeom>
+        </p:spPr>
+      </p:pic>
+      <p:sp>
+        <p:nvSpPr>
+          <p:cNvPr id="18" name="Rectangle 17">
+            <a:extLst>
+              <a:ext uri="{FF2B5EF4-FFF2-40B4-BE49-F238E27FC236}">
+                <a16:creationId xmlns:a16="http://schemas.microsoft.com/office/drawing/2014/main" id="{2DCAE5CF-5D29-4779-83E1-BDB64E4F30E5}"/>
+              </a:ext>
+              <a:ext uri="{C183D7F6-B498-43B3-948B-1728B52AA6E4}">
+                <adec:decorative xmlns:adec="http://schemas.microsoft.com/office/drawing/2017/decorative" val="1"/>
+              </a:ext>
+            </a:extLst>
+          </p:cNvPr>
+          <p:cNvSpPr>
+            <a:spLocks noGrp="1" noRot="1" noChangeAspect="1" noMove="1" noResize="1" noEditPoints="1" noAdjustHandles="1" noChangeArrowheads="1" noChangeShapeType="1" noTextEdit="1"/>
+          </p:cNvSpPr>
+          <p:nvPr>
+            <p:extLst>
+              <p:ext uri="{386F3935-93C4-4BCD-93E2-E3B085C9AB24}">
+                <p16:designElem xmlns:p16="http://schemas.microsoft.com/office/powerpoint/2015/main" val="1"/>
+              </p:ext>
+            </p:extLst>
+          </p:nvPr>
+        </p:nvSpPr>
+        <p:spPr>
+          <a:xfrm>
+            <a:off x="-1" y="1838764"/>
+            <a:ext cx="4964567" cy="3180473"/>
+          </a:xfrm>
+          <a:prstGeom prst="rect">
+            <a:avLst/>
+          </a:prstGeom>
+          <a:solidFill>
+            <a:schemeClr val="bg1">
+              <a:lumMod val="85000"/>
+              <a:lumOff val="15000"/>
+            </a:schemeClr>
+          </a:solidFill>
+          <a:ln>
+            <a:noFill/>
+          </a:ln>
+        </p:spPr>
+        <p:style>
+          <a:lnRef idx="2">
+            <a:schemeClr val="accent1">
+              <a:shade val="50000"/>
+            </a:schemeClr>
+          </a:lnRef>
+          <a:fillRef idx="1">
+            <a:schemeClr val="accent1"/>
+          </a:fillRef>
+          <a:effectRef idx="0">
+            <a:schemeClr val="accent1"/>
+          </a:effectRef>
+          <a:fontRef idx="minor">
+            <a:schemeClr val="lt1"/>
+          </a:fontRef>
+        </p:style>
+      </p:sp>
+      <p:sp>
+        <p:nvSpPr>
+          <p:cNvPr id="2" name="Title 1">
+            <a:extLst>
+              <a:ext uri="{FF2B5EF4-FFF2-40B4-BE49-F238E27FC236}">
+                <a16:creationId xmlns:a16="http://schemas.microsoft.com/office/drawing/2014/main" id="{FC3F4C0B-7243-4806-BA03-1906BF7590D1}"/>
+              </a:ext>
+            </a:extLst>
+          </p:cNvPr>
+          <p:cNvSpPr>
+            <a:spLocks noGrp="1"/>
+          </p:cNvSpPr>
+          <p:nvPr>
+            <p:ph type="title"/>
+          </p:nvPr>
+        </p:nvSpPr>
+        <p:spPr>
+          <a:xfrm>
+            <a:off x="680321" y="2063262"/>
+            <a:ext cx="3739279" cy="2661052"/>
+          </a:xfrm>
+        </p:spPr>
+        <p:txBody>
+          <a:bodyPr>
+            <a:normAutofit/>
+          </a:bodyPr>
+          <a:lstStyle/>
+          <a:p>
+            <a:pPr algn="r"/>
+            <a:r>
+              <a:rPr lang="en-IN" sz="4400"/>
+              <a:t>Advantages of GANs</a:t>
+            </a:r>
+          </a:p>
+        </p:txBody>
+      </p:sp>
+      <p:graphicFrame>
+        <p:nvGraphicFramePr>
+          <p:cNvPr id="5" name="Content Placeholder 2">
+            <a:extLst>
+              <a:ext uri="{FF2B5EF4-FFF2-40B4-BE49-F238E27FC236}">
+                <a16:creationId xmlns:a16="http://schemas.microsoft.com/office/drawing/2014/main" id="{B52EF1C8-5E2E-4E2E-8C6F-F37B9C52D799}"/>
+              </a:ext>
+            </a:extLst>
+          </p:cNvPr>
+          <p:cNvGraphicFramePr>
+            <a:graphicFrameLocks noGrp="1"/>
+          </p:cNvGraphicFramePr>
+          <p:nvPr>
+            <p:ph idx="1"/>
+            <p:extLst>
+              <p:ext uri="{D42A27DB-BD31-4B8C-83A1-F6EECF244321}">
+                <p14:modId xmlns:p14="http://schemas.microsoft.com/office/powerpoint/2010/main" val="2079238593"/>
+              </p:ext>
+            </p:extLst>
+          </p:nvPr>
+        </p:nvGraphicFramePr>
+        <p:xfrm>
+          <a:off x="5284788" y="639763"/>
+          <a:ext cx="6261100" cy="5578475"/>
+        </p:xfrm>
+        <a:graphic>
+          <a:graphicData uri="http://schemas.openxmlformats.org/drawingml/2006/diagram">
+            <dgm:relIds xmlns:dgm="http://schemas.openxmlformats.org/drawingml/2006/diagram" xmlns:r="http://schemas.openxmlformats.org/officeDocument/2006/relationships" r:dm="rId5" r:lo="rId6" r:qs="rId7" r:cs="rId8"/>
+          </a:graphicData>
+        </a:graphic>
+      </p:graphicFrame>
+    </p:spTree>
+    <p:extLst>
+      <p:ext uri="{BB962C8B-B14F-4D97-AF65-F5344CB8AC3E}">
+        <p14:creationId xmlns:p14="http://schemas.microsoft.com/office/powerpoint/2010/main" val="8496570"/>
+      </p:ext>
+    </p:extLst>
+  </p:cSld>
+  <p:clrMapOvr>
+    <a:masterClrMapping/>
+  </p:clrMapOvr>
+</p:sld>
+</file>
+
+<file path=ppt/slides/slide11.xml><?xml version="1.0" encoding="utf-8"?>
+<p:sld xmlns:a="http://schemas.openxmlformats.org/drawingml/2006/main" xmlns:r="http://schemas.openxmlformats.org/officeDocument/2006/relationships" xmlns:p="http://schemas.openxmlformats.org/presentationml/2006/main">
+  <p:cSld>
+    <p:bg>
+      <p:bgPr>
+        <a:gradFill rotWithShape="1">
+          <a:gsLst>
+            <a:gs pos="0">
+              <a:schemeClr val="bg2">
+                <a:tint val="96000"/>
+                <a:shade val="100000"/>
+                <a:hueMod val="270000"/>
+                <a:satMod val="200000"/>
+                <a:lumMod val="128000"/>
+              </a:schemeClr>
+            </a:gs>
+            <a:gs pos="50000">
+              <a:schemeClr val="bg2">
+                <a:shade val="100000"/>
+                <a:hueMod val="100000"/>
+                <a:satMod val="110000"/>
+                <a:lumMod val="130000"/>
+              </a:schemeClr>
+            </a:gs>
+            <a:gs pos="100000">
+              <a:schemeClr val="bg2">
+                <a:shade val="78000"/>
+                <a:hueMod val="44000"/>
+                <a:satMod val="200000"/>
+                <a:lumMod val="69000"/>
+              </a:schemeClr>
+            </a:gs>
+          </a:gsLst>
+          <a:lin ang="2520000" scaled="0"/>
+        </a:gradFill>
+        <a:effectLst/>
+      </p:bgPr>
+    </p:bg>
+    <p:spTree>
+      <p:nvGrpSpPr>
+        <p:cNvPr id="1" name=""/>
+        <p:cNvGrpSpPr/>
+        <p:nvPr/>
+      </p:nvGrpSpPr>
+      <p:grpSpPr>
+        <a:xfrm>
+          <a:off x="0" y="0"/>
+          <a:ext cx="0" cy="0"/>
+          <a:chOff x="0" y="0"/>
+          <a:chExt cx="0" cy="0"/>
+        </a:xfrm>
+      </p:grpSpPr>
+      <p:sp useBgFill="1">
+        <p:nvSpPr>
           <p:cNvPr id="19" name="Rectangle 8">
             <a:extLst>
               <a:ext uri="{FF2B5EF4-FFF2-40B4-BE49-F238E27FC236}">
@@ -30852,7 +31372,7 @@
 </p:sld>
 </file>
 
-<file path=ppt/slides/slide11.xml><?xml version="1.0" encoding="utf-8"?>
+<file path=ppt/slides/slide12.xml><?xml version="1.0" encoding="utf-8"?>
 <p:sld xmlns:a="http://schemas.openxmlformats.org/drawingml/2006/main" xmlns:r="http://schemas.openxmlformats.org/officeDocument/2006/relationships" xmlns:p="http://schemas.openxmlformats.org/presentationml/2006/main">
   <p:cSld>
     <p:bg>
@@ -31233,7 +31753,7 @@
 </p:sld>
 </file>
 
-<file path=ppt/slides/slide12.xml><?xml version="1.0" encoding="utf-8"?>
+<file path=ppt/slides/slide13.xml><?xml version="1.0" encoding="utf-8"?>
 <p:sld xmlns:a="http://schemas.openxmlformats.org/drawingml/2006/main" xmlns:r="http://schemas.openxmlformats.org/officeDocument/2006/relationships" xmlns:p="http://schemas.openxmlformats.org/presentationml/2006/main">
   <p:cSld>
     <p:spTree>
@@ -34814,41 +35334,6 @@
 <file path=ppt/slides/slide9.xml><?xml version="1.0" encoding="utf-8"?>
 <p:sld xmlns:a="http://schemas.openxmlformats.org/drawingml/2006/main" xmlns:r="http://schemas.openxmlformats.org/officeDocument/2006/relationships" xmlns:p="http://schemas.openxmlformats.org/presentationml/2006/main">
   <p:cSld>
-    <p:bg>
-      <p:bgPr>
-        <a:gradFill rotWithShape="1">
-          <a:gsLst>
-            <a:gs pos="0">
-              <a:schemeClr val="bg2">
-                <a:tint val="96000"/>
-                <a:shade val="100000"/>
-                <a:hueMod val="270000"/>
-                <a:satMod val="200000"/>
-                <a:lumMod val="128000"/>
-              </a:schemeClr>
-            </a:gs>
-            <a:gs pos="50000">
-              <a:schemeClr val="bg2">
-                <a:shade val="100000"/>
-                <a:hueMod val="100000"/>
-                <a:satMod val="110000"/>
-                <a:lumMod val="130000"/>
-              </a:schemeClr>
-            </a:gs>
-            <a:gs pos="100000">
-              <a:schemeClr val="bg2">
-                <a:shade val="78000"/>
-                <a:hueMod val="44000"/>
-                <a:satMod val="200000"/>
-                <a:lumMod val="69000"/>
-              </a:schemeClr>
-            </a:gs>
-          </a:gsLst>
-          <a:lin ang="2520000" scaled="0"/>
-        </a:gradFill>
-        <a:effectLst/>
-      </p:bgPr>
-    </p:bg>
     <p:spTree>
       <p:nvGrpSpPr>
         <p:cNvPr id="1" name=""/>
@@ -34863,281 +35348,12 @@
           <a:chExt cx="0" cy="0"/>
         </a:xfrm>
       </p:grpSpPr>
-      <p:sp useBgFill="1">
-        <p:nvSpPr>
-          <p:cNvPr id="10" name="Rectangle 9">
-            <a:extLst>
-              <a:ext uri="{FF2B5EF4-FFF2-40B4-BE49-F238E27FC236}">
-                <a16:creationId xmlns:a16="http://schemas.microsoft.com/office/drawing/2014/main" id="{B2A773CA-28F4-49C2-BFA3-49A5867C7AFB}"/>
-              </a:ext>
-              <a:ext uri="{C183D7F6-B498-43B3-948B-1728B52AA6E4}">
-                <adec:decorative xmlns:adec="http://schemas.microsoft.com/office/drawing/2017/decorative" val="1"/>
-              </a:ext>
-            </a:extLst>
-          </p:cNvPr>
-          <p:cNvSpPr>
-            <a:spLocks noGrp="1" noRot="1" noChangeAspect="1" noMove="1" noResize="1" noEditPoints="1" noAdjustHandles="1" noChangeArrowheads="1" noChangeShapeType="1" noTextEdit="1"/>
-          </p:cNvSpPr>
-          <p:nvPr>
-            <p:extLst>
-              <p:ext uri="{386F3935-93C4-4BCD-93E2-E3B085C9AB24}">
-                <p16:designElem xmlns:p16="http://schemas.microsoft.com/office/powerpoint/2015/main" val="1"/>
-              </p:ext>
-            </p:extLst>
-          </p:nvPr>
-        </p:nvSpPr>
-        <p:spPr>
-          <a:xfrm>
-            <a:off x="0" y="0"/>
-            <a:ext cx="12188824" cy="6858000"/>
-          </a:xfrm>
-          <a:prstGeom prst="rect">
-            <a:avLst/>
-          </a:prstGeom>
-          <a:ln>
-            <a:noFill/>
-          </a:ln>
-        </p:spPr>
-        <p:style>
-          <a:lnRef idx="2">
-            <a:schemeClr val="accent1">
-              <a:shade val="50000"/>
-            </a:schemeClr>
-          </a:lnRef>
-          <a:fillRef idx="1">
-            <a:schemeClr val="accent1"/>
-          </a:fillRef>
-          <a:effectRef idx="0">
-            <a:schemeClr val="accent1"/>
-          </a:effectRef>
-          <a:fontRef idx="minor">
-            <a:schemeClr val="lt1"/>
-          </a:fontRef>
-        </p:style>
-        <p:txBody>
-          <a:bodyPr rtlCol="0" anchor="ctr"/>
-          <a:lstStyle/>
-          <a:p>
-            <a:pPr algn="ctr"/>
-            <a:endParaRPr lang="en-US"/>
-          </a:p>
-        </p:txBody>
-      </p:sp>
-      <p:pic>
-        <p:nvPicPr>
-          <p:cNvPr id="12" name="Picture 11">
-            <a:extLst>
-              <a:ext uri="{FF2B5EF4-FFF2-40B4-BE49-F238E27FC236}">
-                <a16:creationId xmlns:a16="http://schemas.microsoft.com/office/drawing/2014/main" id="{5D7C72BA-4476-4E4B-BC37-9A75FD0C5951}"/>
-              </a:ext>
-              <a:ext uri="{C183D7F6-B498-43B3-948B-1728B52AA6E4}">
-                <adec:decorative xmlns:adec="http://schemas.microsoft.com/office/drawing/2017/decorative" val="1"/>
-              </a:ext>
-            </a:extLst>
-          </p:cNvPr>
-          <p:cNvPicPr>
-            <a:picLocks noGrp="1" noRot="1" noChangeAspect="1" noMove="1" noResize="1" noEditPoints="1" noAdjustHandles="1" noChangeArrowheads="1" noChangeShapeType="1" noCrop="1"/>
-          </p:cNvPicPr>
-          <p:nvPr>
-            <p:extLst>
-              <p:ext uri="{386F3935-93C4-4BCD-93E2-E3B085C9AB24}">
-                <p16:designElem xmlns:p16="http://schemas.microsoft.com/office/powerpoint/2015/main" val="1"/>
-              </p:ext>
-            </p:extLst>
-          </p:nvPr>
-        </p:nvPicPr>
-        <p:blipFill>
-          <a:blip r:embed="rId3">
-            <a:alphaModFix amt="10000"/>
-            <a:extLst>
-              <a:ext uri="{28A0092B-C50C-407E-A947-70E740481C1C}">
-                <a14:useLocalDpi xmlns:a14="http://schemas.microsoft.com/office/drawing/2010/main" val="0"/>
-              </a:ext>
-            </a:extLst>
-          </a:blip>
-          <a:stretch>
-            <a:fillRect/>
-          </a:stretch>
-        </p:blipFill>
-        <p:spPr>
-          <a:xfrm>
-            <a:off x="0" y="0"/>
-            <a:ext cx="12192000" cy="6858000"/>
-          </a:xfrm>
-          <a:prstGeom prst="rect">
-            <a:avLst/>
-          </a:prstGeom>
-        </p:spPr>
-      </p:pic>
-      <p:sp>
-        <p:nvSpPr>
-          <p:cNvPr id="14" name="Rectangle 13">
-            <a:extLst>
-              <a:ext uri="{FF2B5EF4-FFF2-40B4-BE49-F238E27FC236}">
-                <a16:creationId xmlns:a16="http://schemas.microsoft.com/office/drawing/2014/main" id="{3009A16D-868B-4145-BBC6-555098537EC2}"/>
-              </a:ext>
-              <a:ext uri="{C183D7F6-B498-43B3-948B-1728B52AA6E4}">
-                <adec:decorative xmlns:adec="http://schemas.microsoft.com/office/drawing/2017/decorative" val="1"/>
-              </a:ext>
-            </a:extLst>
-          </p:cNvPr>
-          <p:cNvSpPr>
-            <a:spLocks noGrp="1" noRot="1" noChangeAspect="1" noMove="1" noResize="1" noEditPoints="1" noAdjustHandles="1" noChangeArrowheads="1" noChangeShapeType="1" noTextEdit="1"/>
-          </p:cNvSpPr>
-          <p:nvPr>
-            <p:extLst>
-              <p:ext uri="{386F3935-93C4-4BCD-93E2-E3B085C9AB24}">
-                <p16:designElem xmlns:p16="http://schemas.microsoft.com/office/powerpoint/2015/main" val="1"/>
-              </p:ext>
-            </p:extLst>
-          </p:nvPr>
-        </p:nvSpPr>
-        <p:spPr>
-          <a:xfrm>
-            <a:off x="4644527" y="0"/>
-            <a:ext cx="7552944" cy="6858001"/>
-          </a:xfrm>
-          <a:prstGeom prst="rect">
-            <a:avLst/>
-          </a:prstGeom>
-          <a:ln>
-            <a:noFill/>
-          </a:ln>
-        </p:spPr>
-        <p:style>
-          <a:lnRef idx="2">
-            <a:schemeClr val="accent1">
-              <a:shade val="50000"/>
-            </a:schemeClr>
-          </a:lnRef>
-          <a:fillRef idx="1">
-            <a:schemeClr val="accent1"/>
-          </a:fillRef>
-          <a:effectRef idx="0">
-            <a:schemeClr val="accent1"/>
-          </a:effectRef>
-          <a:fontRef idx="minor">
-            <a:schemeClr val="lt1"/>
-          </a:fontRef>
-        </p:style>
-        <p:txBody>
-          <a:bodyPr rtlCol="0" anchor="ctr"/>
-          <a:lstStyle/>
-          <a:p>
-            <a:pPr algn="ctr"/>
-            <a:endParaRPr lang="en-US"/>
-          </a:p>
-        </p:txBody>
-      </p:sp>
-      <p:pic>
-        <p:nvPicPr>
-          <p:cNvPr id="16" name="Picture 15">
-            <a:extLst>
-              <a:ext uri="{FF2B5EF4-FFF2-40B4-BE49-F238E27FC236}">
-                <a16:creationId xmlns:a16="http://schemas.microsoft.com/office/drawing/2014/main" id="{3992EB33-38E1-4175-8EE2-9BB8CC159C7B}"/>
-              </a:ext>
-              <a:ext uri="{C183D7F6-B498-43B3-948B-1728B52AA6E4}">
-                <adec:decorative xmlns:adec="http://schemas.microsoft.com/office/drawing/2017/decorative" val="1"/>
-              </a:ext>
-            </a:extLst>
-          </p:cNvPr>
-          <p:cNvPicPr>
-            <a:picLocks noGrp="1" noRot="1" noChangeAspect="1" noMove="1" noResize="1" noEditPoints="1" noAdjustHandles="1" noChangeArrowheads="1" noChangeShapeType="1" noCrop="1"/>
-          </p:cNvPicPr>
-          <p:nvPr>
-            <p:extLst>
-              <p:ext uri="{386F3935-93C4-4BCD-93E2-E3B085C9AB24}">
-                <p16:designElem xmlns:p16="http://schemas.microsoft.com/office/powerpoint/2015/main" val="1"/>
-              </p:ext>
-            </p:extLst>
-          </p:nvPr>
-        </p:nvPicPr>
-        <p:blipFill>
-          <a:blip r:embed="rId4" cstate="print">
-            <a:extLst>
-              <a:ext uri="{28A0092B-C50C-407E-A947-70E740481C1C}">
-                <a14:useLocalDpi xmlns:a14="http://schemas.microsoft.com/office/drawing/2010/main" val="0"/>
-              </a:ext>
-            </a:extLst>
-          </a:blip>
-          <a:stretch>
-            <a:fillRect/>
-          </a:stretch>
-        </p:blipFill>
-        <p:spPr>
-          <a:xfrm>
-            <a:off x="1" y="5006045"/>
-            <a:ext cx="4965192" cy="144668"/>
-          </a:xfrm>
-          <a:prstGeom prst="rect">
-            <a:avLst/>
-          </a:prstGeom>
-        </p:spPr>
-      </p:pic>
-      <p:sp>
-        <p:nvSpPr>
-          <p:cNvPr id="18" name="Rectangle 17">
-            <a:extLst>
-              <a:ext uri="{FF2B5EF4-FFF2-40B4-BE49-F238E27FC236}">
-                <a16:creationId xmlns:a16="http://schemas.microsoft.com/office/drawing/2014/main" id="{2DCAE5CF-5D29-4779-83E1-BDB64E4F30E5}"/>
-              </a:ext>
-              <a:ext uri="{C183D7F6-B498-43B3-948B-1728B52AA6E4}">
-                <adec:decorative xmlns:adec="http://schemas.microsoft.com/office/drawing/2017/decorative" val="1"/>
-              </a:ext>
-            </a:extLst>
-          </p:cNvPr>
-          <p:cNvSpPr>
-            <a:spLocks noGrp="1" noRot="1" noChangeAspect="1" noMove="1" noResize="1" noEditPoints="1" noAdjustHandles="1" noChangeArrowheads="1" noChangeShapeType="1" noTextEdit="1"/>
-          </p:cNvSpPr>
-          <p:nvPr>
-            <p:extLst>
-              <p:ext uri="{386F3935-93C4-4BCD-93E2-E3B085C9AB24}">
-                <p16:designElem xmlns:p16="http://schemas.microsoft.com/office/powerpoint/2015/main" val="1"/>
-              </p:ext>
-            </p:extLst>
-          </p:nvPr>
-        </p:nvSpPr>
-        <p:spPr>
-          <a:xfrm>
-            <a:off x="-1" y="1838764"/>
-            <a:ext cx="4964567" cy="3180473"/>
-          </a:xfrm>
-          <a:prstGeom prst="rect">
-            <a:avLst/>
-          </a:prstGeom>
-          <a:solidFill>
-            <a:schemeClr val="bg1">
-              <a:lumMod val="85000"/>
-              <a:lumOff val="15000"/>
-            </a:schemeClr>
-          </a:solidFill>
-          <a:ln>
-            <a:noFill/>
-          </a:ln>
-        </p:spPr>
-        <p:style>
-          <a:lnRef idx="2">
-            <a:schemeClr val="accent1">
-              <a:shade val="50000"/>
-            </a:schemeClr>
-          </a:lnRef>
-          <a:fillRef idx="1">
-            <a:schemeClr val="accent1"/>
-          </a:fillRef>
-          <a:effectRef idx="0">
-            <a:schemeClr val="accent1"/>
-          </a:effectRef>
-          <a:fontRef idx="minor">
-            <a:schemeClr val="lt1"/>
-          </a:fontRef>
-        </p:style>
-      </p:sp>
       <p:sp>
         <p:nvSpPr>
           <p:cNvPr id="2" name="Title 1">
             <a:extLst>
               <a:ext uri="{FF2B5EF4-FFF2-40B4-BE49-F238E27FC236}">
-                <a16:creationId xmlns:a16="http://schemas.microsoft.com/office/drawing/2014/main" id="{FC3F4C0B-7243-4806-BA03-1906BF7590D1}"/>
+                <a16:creationId xmlns:a16="http://schemas.microsoft.com/office/drawing/2014/main" id="{135480D9-D257-49DD-9401-2255463D440A}"/>
               </a:ext>
             </a:extLst>
           </p:cNvPr>
@@ -35148,61 +35364,51 @@
             <p:ph type="title"/>
           </p:nvPr>
         </p:nvSpPr>
-        <p:spPr>
-          <a:xfrm>
-            <a:off x="680321" y="2063262"/>
-            <a:ext cx="3739279" cy="2661052"/>
-          </a:xfrm>
-        </p:spPr>
+        <p:spPr/>
         <p:txBody>
-          <a:bodyPr>
-            <a:normAutofit/>
-          </a:bodyPr>
+          <a:bodyPr/>
           <a:lstStyle/>
           <a:p>
-            <a:pPr algn="r"/>
             <a:r>
-              <a:rPr lang="en-IN" sz="4400"/>
-              <a:t>Advantages of GANs</a:t>
+              <a:rPr lang="en-IN" dirty="0"/>
+              <a:t>Experiments</a:t>
             </a:r>
           </a:p>
         </p:txBody>
       </p:sp>
-      <p:graphicFrame>
-        <p:nvGraphicFramePr>
-          <p:cNvPr id="5" name="Content Placeholder 2">
+      <p:pic>
+        <p:nvPicPr>
+          <p:cNvPr id="5" name="Content Placeholder 4">
             <a:extLst>
               <a:ext uri="{FF2B5EF4-FFF2-40B4-BE49-F238E27FC236}">
-                <a16:creationId xmlns:a16="http://schemas.microsoft.com/office/drawing/2014/main" id="{B52EF1C8-5E2E-4E2E-8C6F-F37B9C52D799}"/>
+                <a16:creationId xmlns:a16="http://schemas.microsoft.com/office/drawing/2014/main" id="{EE3E65DE-4458-4898-A79F-68799646032C}"/>
               </a:ext>
             </a:extLst>
           </p:cNvPr>
-          <p:cNvGraphicFramePr>
-            <a:graphicFrameLocks noGrp="1"/>
-          </p:cNvGraphicFramePr>
+          <p:cNvPicPr>
+            <a:picLocks noGrp="1" noChangeAspect="1"/>
+          </p:cNvPicPr>
           <p:nvPr>
             <p:ph idx="1"/>
-            <p:extLst>
-              <p:ext uri="{D42A27DB-BD31-4B8C-83A1-F6EECF244321}">
-                <p14:modId xmlns:p14="http://schemas.microsoft.com/office/powerpoint/2010/main" val="2079238593"/>
-              </p:ext>
-            </p:extLst>
           </p:nvPr>
-        </p:nvGraphicFramePr>
-        <p:xfrm>
-          <a:off x="5284788" y="639763"/>
-          <a:ext cx="6261100" cy="5578475"/>
-        </p:xfrm>
-        <a:graphic>
-          <a:graphicData uri="http://schemas.openxmlformats.org/drawingml/2006/diagram">
-            <dgm:relIds xmlns:dgm="http://schemas.openxmlformats.org/drawingml/2006/diagram" xmlns:r="http://schemas.openxmlformats.org/officeDocument/2006/relationships" r:dm="rId5" r:lo="rId6" r:qs="rId7" r:cs="rId8"/>
-          </a:graphicData>
-        </a:graphic>
-      </p:graphicFrame>
+        </p:nvPicPr>
+        <p:blipFill>
+          <a:blip r:embed="rId3"/>
+          <a:stretch>
+            <a:fillRect/>
+          </a:stretch>
+        </p:blipFill>
+        <p:spPr>
+          <a:xfrm>
+            <a:off x="2462784" y="2092960"/>
+            <a:ext cx="6254496" cy="4367705"/>
+          </a:xfrm>
+        </p:spPr>
+      </p:pic>
     </p:spTree>
     <p:extLst>
       <p:ext uri="{BB962C8B-B14F-4D97-AF65-F5344CB8AC3E}">
-        <p14:creationId xmlns:p14="http://schemas.microsoft.com/office/powerpoint/2010/main" val="8496570"/>
+        <p14:creationId xmlns:p14="http://schemas.microsoft.com/office/powerpoint/2010/main" val="1535136061"/>
       </p:ext>
     </p:extLst>
   </p:cSld>

</xml_diff>